<commit_message>
updated slides with highlighting
</commit_message>
<xml_diff>
--- a/presentations/DraftAnnotationSchema.pptx
+++ b/presentations/DraftAnnotationSchema.pptx
@@ -220,7 +220,7 @@
           <a:p>
             <a:fld id="{020E5086-35F3-4DCE-9990-5C8AC6F8D856}" type="datetimeFigureOut">
               <a:rPr lang="en-US" smtClean="0"/>
-              <a:t>2/11/16</a:t>
+              <a:t>2/12/16</a:t>
             </a:fld>
             <a:endParaRPr lang="en-US"/>
           </a:p>
@@ -834,6 +834,90 @@
 </p:notes>
 </file>
 
+<file path=ppt/notesSlides/notesSlide13.xml><?xml version="1.0" encoding="utf-8"?>
+<p:notes xmlns:a="http://schemas.openxmlformats.org/drawingml/2006/main" xmlns:r="http://schemas.openxmlformats.org/officeDocument/2006/relationships" xmlns:p="http://schemas.openxmlformats.org/presentationml/2006/main">
+  <p:cSld>
+    <p:spTree>
+      <p:nvGrpSpPr>
+        <p:cNvPr id="1" name=""/>
+        <p:cNvGrpSpPr/>
+        <p:nvPr/>
+      </p:nvGrpSpPr>
+      <p:grpSpPr>
+        <a:xfrm>
+          <a:off x="0" y="0"/>
+          <a:ext cx="0" cy="0"/>
+          <a:chOff x="0" y="0"/>
+          <a:chExt cx="0" cy="0"/>
+        </a:xfrm>
+      </p:grpSpPr>
+      <p:sp>
+        <p:nvSpPr>
+          <p:cNvPr id="2" name="Slide Image Placeholder 1"/>
+          <p:cNvSpPr>
+            <a:spLocks noGrp="1" noRot="1" noChangeAspect="1"/>
+          </p:cNvSpPr>
+          <p:nvPr>
+            <p:ph type="sldImg"/>
+          </p:nvPr>
+        </p:nvSpPr>
+        <p:spPr/>
+      </p:sp>
+      <p:sp>
+        <p:nvSpPr>
+          <p:cNvPr id="3" name="Notes Placeholder 2"/>
+          <p:cNvSpPr>
+            <a:spLocks noGrp="1"/>
+          </p:cNvSpPr>
+          <p:nvPr>
+            <p:ph type="body" idx="1"/>
+          </p:nvPr>
+        </p:nvSpPr>
+        <p:spPr/>
+        <p:txBody>
+          <a:bodyPr/>
+          <a:lstStyle/>
+          <a:p>
+            <a:endParaRPr lang="en-US"/>
+          </a:p>
+        </p:txBody>
+      </p:sp>
+      <p:sp>
+        <p:nvSpPr>
+          <p:cNvPr id="4" name="Slide Number Placeholder 3"/>
+          <p:cNvSpPr>
+            <a:spLocks noGrp="1"/>
+          </p:cNvSpPr>
+          <p:nvPr>
+            <p:ph type="sldNum" sz="quarter" idx="10"/>
+          </p:nvPr>
+        </p:nvSpPr>
+        <p:spPr/>
+        <p:txBody>
+          <a:bodyPr/>
+          <a:lstStyle/>
+          <a:p>
+            <a:fld id="{214FF7D5-1A20-4F32-9843-9DE3F7119611}" type="slidenum">
+              <a:rPr lang="en-US" smtClean="0"/>
+              <a:t>13</a:t>
+            </a:fld>
+            <a:endParaRPr lang="en-US"/>
+          </a:p>
+        </p:txBody>
+      </p:sp>
+    </p:spTree>
+    <p:extLst>
+      <p:ext uri="{BB962C8B-B14F-4D97-AF65-F5344CB8AC3E}">
+        <p14:creationId xmlns:p14="http://schemas.microsoft.com/office/powerpoint/2010/main" val="1157668544"/>
+      </p:ext>
+    </p:extLst>
+  </p:cSld>
+  <p:clrMapOvr>
+    <a:masterClrMapping/>
+  </p:clrMapOvr>
+</p:notes>
+</file>
+
 <file path=ppt/notesSlides/notesSlide2.xml><?xml version="1.0" encoding="utf-8"?>
 <p:notes xmlns:a="http://schemas.openxmlformats.org/drawingml/2006/main" xmlns:r="http://schemas.openxmlformats.org/officeDocument/2006/relationships" xmlns:p="http://schemas.openxmlformats.org/presentationml/2006/main">
   <p:cSld>
@@ -1712,7 +1796,7 @@
           <a:p>
             <a:fld id="{5459D96C-C0D0-4BA2-A7C9-85F16BC7062D}" type="datetime1">
               <a:rPr lang="en-US" smtClean="0"/>
-              <a:t>2/11/16</a:t>
+              <a:t>2/12/16</a:t>
             </a:fld>
             <a:endParaRPr lang="en-US" dirty="0"/>
           </a:p>
@@ -1878,7 +1962,7 @@
           <a:p>
             <a:fld id="{8CD5C228-0EC6-4405-A31A-71C93D913167}" type="datetime1">
               <a:rPr lang="en-US" smtClean="0"/>
-              <a:t>2/11/16</a:t>
+              <a:t>2/12/16</a:t>
             </a:fld>
             <a:endParaRPr lang="en-US" dirty="0"/>
           </a:p>
@@ -2053,7 +2137,7 @@
           <a:p>
             <a:fld id="{A20F7E3D-1891-4B3E-94CB-8EFA3CE5581E}" type="datetime1">
               <a:rPr lang="en-US" smtClean="0"/>
-              <a:t>2/11/16</a:t>
+              <a:t>2/12/16</a:t>
             </a:fld>
             <a:endParaRPr lang="en-US" dirty="0"/>
           </a:p>
@@ -2218,7 +2302,7 @@
           <a:p>
             <a:fld id="{915DA1D9-7692-4296-AFE8-84651271B9F6}" type="datetime1">
               <a:rPr lang="en-US" smtClean="0"/>
-              <a:t>2/11/16</a:t>
+              <a:t>2/12/16</a:t>
             </a:fld>
             <a:endParaRPr lang="en-US" dirty="0"/>
           </a:p>
@@ -2482,7 +2566,7 @@
           <a:p>
             <a:fld id="{AE052A51-5EE1-4E61-959A-74794976D5F2}" type="datetime1">
               <a:rPr lang="en-US" smtClean="0"/>
-              <a:t>2/11/16</a:t>
+              <a:t>2/12/16</a:t>
             </a:fld>
             <a:endParaRPr lang="en-US" dirty="0"/>
           </a:p>
@@ -2710,7 +2794,7 @@
           <a:p>
             <a:fld id="{225580D6-D628-4CEC-B2B7-B2BBBC7AC3E7}" type="datetime1">
               <a:rPr lang="en-US" smtClean="0"/>
-              <a:t>2/11/16</a:t>
+              <a:t>2/12/16</a:t>
             </a:fld>
             <a:endParaRPr lang="en-US" dirty="0"/>
           </a:p>
@@ -3060,7 +3144,7 @@
           <a:p>
             <a:fld id="{35188174-9DA0-4D8A-82E7-3B7AE6032450}" type="datetime1">
               <a:rPr lang="en-US" smtClean="0"/>
-              <a:t>2/11/16</a:t>
+              <a:t>2/12/16</a:t>
             </a:fld>
             <a:endParaRPr lang="en-US" dirty="0"/>
           </a:p>
@@ -3196,7 +3280,7 @@
           <a:p>
             <a:fld id="{75CB2A1B-BC17-41A0-A1DB-A11F4E73C2F3}" type="datetime1">
               <a:rPr lang="en-US" smtClean="0"/>
-              <a:t>2/11/16</a:t>
+              <a:t>2/12/16</a:t>
             </a:fld>
             <a:endParaRPr lang="en-US" dirty="0"/>
           </a:p>
@@ -3286,7 +3370,7 @@
           <a:p>
             <a:fld id="{4B9F29BF-0A45-4BC3-A3CD-BF0B3DB6A263}" type="datetime1">
               <a:rPr lang="en-US" smtClean="0"/>
-              <a:t>2/11/16</a:t>
+              <a:t>2/12/16</a:t>
             </a:fld>
             <a:endParaRPr lang="en-US" dirty="0"/>
           </a:p>
@@ -3638,7 +3722,7 @@
           <a:p>
             <a:fld id="{DFDD6F2E-73CF-4499-8194-47ECDC70424D}" type="datetime1">
               <a:rPr lang="en-US" smtClean="0"/>
-              <a:t>2/11/16</a:t>
+              <a:t>2/12/16</a:t>
             </a:fld>
             <a:endParaRPr lang="en-US" dirty="0"/>
           </a:p>
@@ -3990,7 +4074,7 @@
           <a:p>
             <a:fld id="{867911C2-40D2-4AEB-9F0F-5A4CB05524D4}" type="datetime1">
               <a:rPr lang="en-US" smtClean="0"/>
-              <a:t>2/11/16</a:t>
+              <a:t>2/12/16</a:t>
             </a:fld>
             <a:endParaRPr lang="en-US" dirty="0"/>
           </a:p>
@@ -4225,7 +4309,7 @@
           <a:p>
             <a:fld id="{77B6DE33-15C2-4DCE-8C62-EA7494593CAD}" type="datetime1">
               <a:rPr lang="en-US" smtClean="0"/>
-              <a:t>2/11/16</a:t>
+              <a:t>2/12/16</a:t>
             </a:fld>
             <a:endParaRPr lang="en-US" dirty="0"/>
           </a:p>
@@ -4816,10 +4900,9 @@
           <a:lstStyle/>
           <a:p>
             <a:r>
-              <a:rPr lang="en-US" smtClean="0"/>
+              <a:rPr lang="en-US"/>
               <a:t>Discourse &amp; style</a:t>
             </a:r>
-            <a:endParaRPr lang="en-US"/>
           </a:p>
         </p:txBody>
       </p:sp>
@@ -4935,7 +5018,9 @@
           </a:xfrm>
         </p:spPr>
         <p:txBody>
-          <a:bodyPr/>
+          <a:bodyPr vert="horz" lIns="91440" tIns="45720" rIns="91440" bIns="45720" rtlCol="0" anchor="t">
+            <a:normAutofit/>
+          </a:bodyPr>
           <a:lstStyle/>
           <a:p>
             <a:pPr marL="0" indent="0">
@@ -4943,23 +5028,7 @@
             </a:pPr>
             <a:r>
               <a:rPr lang="en-US" dirty="0"/>
-              <a:t>for example if a student takes the course of like computer subject in this it can have different subjects are </a:t>
-            </a:r>
-            <a:r>
-              <a:rPr lang="en-US" dirty="0" err="1"/>
-              <a:t>there.If</a:t>
-            </a:r>
-            <a:r>
-              <a:rPr lang="en-US" dirty="0"/>
-              <a:t> the student to choose the subject java </a:t>
-            </a:r>
-            <a:r>
-              <a:rPr lang="en-US" dirty="0" err="1"/>
-              <a:t>course.The</a:t>
-            </a:r>
-            <a:r>
-              <a:rPr lang="en-US" dirty="0"/>
-              <a:t> student can concentrate on that subject. so he can get the good score. Suppose if  job   is not get he can teach the subject to other students and he can get the salary. This is other way doing if he can't get the job.</a:t>
+              <a:t>for example if a student takes the course of like computer subject in this it can have different subjects are there.If the student to choose the subject java course.The student can concentrate on that subject. so he can get the good score. Suppose if  job   is not get he can teach the subject to other students and he can get the salary. This is other way doing if he can't get the job.</a:t>
             </a:r>
           </a:p>
         </p:txBody>
@@ -5067,17 +5136,13 @@
             </a:r>
             <a:r>
               <a:rPr lang="en-US"/>
-              <a:t>look </a:t>
-            </a:r>
-            <a:r>
-              <a:rPr lang="en-US" smtClean="0"/>
-              <a:t>at</a:t>
+              <a:t>look at</a:t>
             </a:r>
             <a:br>
-              <a:rPr lang="en-US" smtClean="0"/>
+              <a:rPr lang="en-US"/>
             </a:br>
             <a:r>
-              <a:rPr lang="en-US" smtClean="0"/>
+              <a:rPr lang="en-US"/>
               <a:t>in </a:t>
             </a:r>
             <a:r>
@@ -5197,10 +5262,9 @@
           <a:lstStyle/>
           <a:p>
             <a:r>
-              <a:rPr lang="en-US" dirty="0" smtClean="0"/>
+              <a:rPr lang="en-US" dirty="0"/>
               <a:t>Other things to consider</a:t>
             </a:r>
-            <a:endParaRPr lang="en-US" dirty="0"/>
           </a:p>
         </p:txBody>
       </p:sp>
@@ -5220,22 +5284,21 @@
           <a:lstStyle/>
           <a:p>
             <a:r>
-              <a:rPr lang="en-US" dirty="0" smtClean="0"/>
+              <a:rPr lang="en-US" dirty="0"/>
               <a:t>Style/awkwardness</a:t>
             </a:r>
           </a:p>
           <a:p>
             <a:r>
-              <a:rPr lang="en-US" dirty="0" smtClean="0"/>
+              <a:rPr lang="en-US" dirty="0"/>
               <a:t>Word choice</a:t>
             </a:r>
           </a:p>
           <a:p>
             <a:r>
-              <a:rPr lang="en-US" dirty="0" smtClean="0"/>
+              <a:rPr lang="en-US" dirty="0"/>
               <a:t>Correct choices: what they get right can be just as informative as what is wrong</a:t>
             </a:r>
-            <a:endParaRPr lang="en-US" dirty="0"/>
           </a:p>
         </p:txBody>
       </p:sp>
@@ -5539,20 +5602,32 @@
           <a:lstStyle/>
           <a:p>
             <a:r>
-              <a:rPr lang="en-US" dirty="0"/>
+              <a:rPr lang="en-US" dirty="0">
+                <a:solidFill>
+                  <a:srgbClr val="7030A0"/>
+                </a:solidFill>
+              </a:rPr>
               <a:t>Missing copula</a:t>
             </a:r>
           </a:p>
           <a:p>
             <a:r>
-              <a:rPr lang="en-US" dirty="0"/>
+              <a:rPr lang="en-US" dirty="0">
+                <a:solidFill>
+                  <a:srgbClr val="FF0000"/>
+                </a:solidFill>
+              </a:rPr>
               <a:t>Number disagreement</a:t>
             </a:r>
           </a:p>
           <a:p>
             <a:r>
-              <a:rPr lang="en-US" dirty="0"/>
-              <a:t>Other</a:t>
+              <a:rPr lang="en-US" dirty="0">
+                <a:solidFill>
+                  <a:srgbClr val="002060"/>
+                </a:solidFill>
+              </a:rPr>
+              <a:t>Other(?)</a:t>
             </a:r>
           </a:p>
         </p:txBody>
@@ -5574,14 +5649,38 @@
           <a:noFill/>
         </p:spPr>
         <p:txBody>
-          <a:bodyPr wrap="square" rtlCol="0">
+          <a:bodyPr wrap="square" rtlCol="0" anchor="t">
             <a:spAutoFit/>
           </a:bodyPr>
           <a:lstStyle/>
           <a:p>
             <a:r>
               <a:rPr lang="en-US" dirty="0"/>
-              <a:t>It is a big misconception that youth is inactive in community service today. 		First, I have a friend called Ravi. He is a very busy and diligent student. He very normal and contemporary.</a:t>
+              <a:t>It is a big misconception that youth </a:t>
+            </a:r>
+            <a:r>
+              <a:rPr lang="en-US" dirty="0">
+                <a:solidFill>
+                  <a:srgbClr val="FF0000"/>
+                </a:solidFill>
+              </a:rPr>
+              <a:t>is </a:t>
+            </a:r>
+            <a:r>
+              <a:rPr lang="en-US" dirty="0"/>
+              <a:t>inactive in community service today. 		First, I have a friend called Ravi. He is a very busy and diligent student. He </a:t>
+            </a:r>
+            <a:r>
+              <a:rPr lang="en-US" dirty="0">
+                <a:solidFill>
+                  <a:srgbClr val="7030A0"/>
+                </a:solidFill>
+              </a:rPr>
+              <a:t>[…]</a:t>
+            </a:r>
+            <a:r>
+              <a:rPr lang="en-US" dirty="0"/>
+              <a:t> very normal and contemporary.</a:t>
             </a:r>
           </a:p>
         </p:txBody>
@@ -5602,22 +5701,14 @@
           </a:prstGeom>
         </p:spPr>
         <p:txBody>
-          <a:bodyPr wrap="square">
+          <a:bodyPr wrap="square" anchor="t">
             <a:spAutoFit/>
           </a:bodyPr>
           <a:lstStyle/>
           <a:p>
             <a:r>
               <a:rPr lang="en-US" dirty="0"/>
-              <a:t>for example that the older one cannot enjoy with his friends by going out and </a:t>
-            </a:r>
-            <a:r>
-              <a:rPr lang="en-US" dirty="0" err="1"/>
-              <a:t>party.because</a:t>
-            </a:r>
-            <a:r>
-              <a:rPr lang="en-US" dirty="0"/>
-              <a:t> he will be in such a position that it will </a:t>
+              <a:t>for example that the older one cannot enjoy with his friends by going out and party.because he will be in such a position that it will </a:t>
             </a:r>
             <a:r>
               <a:rPr lang="en-US" dirty="0" err="1"/>
@@ -5628,12 +5719,16 @@
               <a:t> him but the younger one </a:t>
             </a:r>
             <a:r>
-              <a:rPr lang="en-US" dirty="0" err="1"/>
-              <a:t>doesnt.he</a:t>
-            </a:r>
-            <a:r>
-              <a:rPr lang="en-US" dirty="0"/>
-              <a:t> surely and </a:t>
+              <a:rPr lang="en-US" dirty="0">
+                <a:solidFill>
+                  <a:srgbClr val="002060"/>
+                </a:solidFill>
+              </a:rPr>
+              <a:t>doesnt</a:t>
+            </a:r>
+            <a:r>
+              <a:rPr lang="en-US" dirty="0"/>
+              <a:t>.he surely and </a:t>
             </a:r>
             <a:r>
               <a:rPr lang="en-US" dirty="0" err="1"/>
@@ -5641,7 +5736,31 @@
             </a:r>
             <a:r>
               <a:rPr lang="en-US" dirty="0"/>
-              <a:t> go out with his friend and enjoy </a:t>
+              <a:t> </a:t>
+            </a:r>
+            <a:r>
+              <a:rPr lang="en-US" dirty="0">
+                <a:solidFill>
+                  <a:srgbClr val="FF0000"/>
+                </a:solidFill>
+              </a:rPr>
+              <a:t>go</a:t>
+            </a:r>
+            <a:r>
+              <a:rPr lang="en-US" dirty="0"/>
+              <a:t> out with his friend and </a:t>
+            </a:r>
+            <a:r>
+              <a:rPr lang="en-US" dirty="0">
+                <a:solidFill>
+                  <a:srgbClr val="FF0000"/>
+                </a:solidFill>
+              </a:rPr>
+              <a:t>enjoy</a:t>
+            </a:r>
+            <a:r>
+              <a:rPr lang="en-US" dirty="0"/>
+              <a:t> </a:t>
             </a:r>
             <a:r>
               <a:rPr lang="en-US" dirty="0" err="1"/>
@@ -5747,7 +5866,7 @@
           </a:xfrm>
         </p:spPr>
         <p:txBody>
-          <a:bodyPr>
+          <a:bodyPr vert="horz" lIns="91440" tIns="45720" rIns="91440" bIns="45720" rtlCol="0" anchor="t">
             <a:normAutofit/>
           </a:bodyPr>
           <a:lstStyle/>
@@ -5757,7 +5876,19 @@
             </a:pPr>
             <a:r>
               <a:rPr lang="en-US" sz="1800" dirty="0"/>
-              <a:t>When I see the </a:t>
+              <a:t>When I </a:t>
+            </a:r>
+            <a:r>
+              <a:rPr lang="en-US" sz="1800" dirty="0">
+                <a:solidFill>
+                  <a:srgbClr val="DF5327"/>
+                </a:solidFill>
+              </a:rPr>
+              <a:t>see </a:t>
+            </a:r>
+            <a:r>
+              <a:rPr lang="en-US" sz="1800" dirty="0"/>
+              <a:t>the </a:t>
             </a:r>
             <a:r>
               <a:rPr lang="en-US" sz="1800" dirty="0" err="1"/>
@@ -5773,7 +5904,19 @@
             </a:r>
             <a:r>
               <a:rPr lang="en-US" sz="1800" dirty="0"/>
-              <a:t> self- portrait, I thought it's so </a:t>
+              <a:t> self- portrait, I </a:t>
+            </a:r>
+            <a:r>
+              <a:rPr lang="en-US" sz="1800" dirty="0">
+                <a:solidFill>
+                  <a:srgbClr val="DF5327"/>
+                </a:solidFill>
+              </a:rPr>
+              <a:t>thought </a:t>
+            </a:r>
+            <a:r>
+              <a:rPr lang="en-US" sz="1800" dirty="0"/>
+              <a:t>it's so </a:t>
             </a:r>
             <a:r>
               <a:rPr lang="en-US" sz="1800" dirty="0" err="1"/>
@@ -5789,7 +5932,43 @@
             </a:r>
             <a:r>
               <a:rPr lang="en-US" sz="1800" dirty="0"/>
-              <a:t> there is not even any human's face and there is only blood and animals. But after I learned to understand ideas and </a:t>
+              <a:t> there</a:t>
+            </a:r>
+            <a:r>
+              <a:rPr lang="en-US" sz="1800" dirty="0">
+                <a:solidFill>
+                  <a:srgbClr val="DF5327"/>
+                </a:solidFill>
+              </a:rPr>
+              <a:t> is</a:t>
+            </a:r>
+            <a:r>
+              <a:rPr lang="en-US" sz="1800" dirty="0"/>
+              <a:t> not even any human's face and there </a:t>
+            </a:r>
+            <a:r>
+              <a:rPr lang="en-US" sz="1800" dirty="0">
+                <a:solidFill>
+                  <a:srgbClr val="DF5327"/>
+                </a:solidFill>
+              </a:rPr>
+              <a:t>is </a:t>
+            </a:r>
+            <a:r>
+              <a:rPr lang="en-US" sz="1800" dirty="0"/>
+              <a:t>only blood and animals. But after I </a:t>
+            </a:r>
+            <a:r>
+              <a:rPr lang="en-US" sz="1800" dirty="0">
+                <a:solidFill>
+                  <a:srgbClr val="DF5327"/>
+                </a:solidFill>
+              </a:rPr>
+              <a:t>learned</a:t>
+            </a:r>
+            <a:r>
+              <a:rPr lang="en-US" sz="1800" dirty="0"/>
+              <a:t> to understand ideas and </a:t>
             </a:r>
             <a:r>
               <a:rPr lang="en-US" sz="1800" dirty="0" err="1"/>
@@ -5797,7 +5976,19 @@
             </a:r>
             <a:r>
               <a:rPr lang="en-US" sz="1800" dirty="0"/>
-              <a:t>, I totally agree and satisfied with her art </a:t>
+              <a:t>, I totally </a:t>
+            </a:r>
+            <a:r>
+              <a:rPr lang="en-US" sz="1800" dirty="0">
+                <a:solidFill>
+                  <a:srgbClr val="DF5327"/>
+                </a:solidFill>
+              </a:rPr>
+              <a:t>agree</a:t>
+            </a:r>
+            <a:r>
+              <a:rPr lang="en-US" sz="1800" dirty="0"/>
+              <a:t> and satisfied with her art </a:t>
             </a:r>
             <a:r>
               <a:rPr lang="en-US" sz="1800" dirty="0" err="1"/>
@@ -5846,7 +6037,7 @@
           <a:noFill/>
         </p:spPr>
         <p:txBody>
-          <a:bodyPr wrap="square" rtlCol="0">
+          <a:bodyPr wrap="square" rtlCol="0" anchor="t">
             <a:spAutoFit/>
           </a:bodyPr>
           <a:lstStyle/>
@@ -5865,7 +6056,19 @@
             </a:r>
             <a:r>
               <a:rPr lang="en-US" dirty="0"/>
-              <a:t> get a good job form a world-wide </a:t>
+              <a:t> </a:t>
+            </a:r>
+            <a:r>
+              <a:rPr lang="en-US" dirty="0">
+                <a:solidFill>
+                  <a:srgbClr val="DF5327"/>
+                </a:solidFill>
+              </a:rPr>
+              <a:t>get</a:t>
+            </a:r>
+            <a:r>
+              <a:rPr lang="en-US" dirty="0"/>
+              <a:t> a good job form a world-wide </a:t>
             </a:r>
             <a:r>
               <a:rPr lang="en-US" dirty="0" err="1"/>
@@ -5873,7 +6076,19 @@
             </a:r>
             <a:r>
               <a:rPr lang="en-US" dirty="0"/>
-              <a:t> he get a high </a:t>
+              <a:t> he </a:t>
+            </a:r>
+            <a:r>
+              <a:rPr lang="en-US" dirty="0">
+                <a:solidFill>
+                  <a:srgbClr val="DF5327"/>
+                </a:solidFill>
+              </a:rPr>
+              <a:t>get</a:t>
+            </a:r>
+            <a:r>
+              <a:rPr lang="en-US" dirty="0"/>
+              <a:t> a high </a:t>
             </a:r>
             <a:r>
               <a:rPr lang="en-US" dirty="0" err="1"/>
@@ -5881,7 +6096,19 @@
             </a:r>
             <a:r>
               <a:rPr lang="en-US" dirty="0"/>
-              <a:t>, he said that </a:t>
+              <a:t>, he </a:t>
+            </a:r>
+            <a:r>
+              <a:rPr lang="en-US" dirty="0">
+                <a:solidFill>
+                  <a:srgbClr val="DF5327"/>
+                </a:solidFill>
+              </a:rPr>
+              <a:t>said </a:t>
+            </a:r>
+            <a:r>
+              <a:rPr lang="en-US" dirty="0"/>
+              <a:t>that </a:t>
             </a:r>
             <a:r>
               <a:rPr lang="en-US" dirty="0" err="1"/>
@@ -5889,7 +6116,19 @@
             </a:r>
             <a:r>
               <a:rPr lang="en-US" dirty="0"/>
-              <a:t> a car become the most </a:t>
+              <a:t> a car </a:t>
+            </a:r>
+            <a:r>
+              <a:rPr lang="en-US" dirty="0">
+                <a:solidFill>
+                  <a:srgbClr val="DF5327"/>
+                </a:solidFill>
+              </a:rPr>
+              <a:t>become </a:t>
+            </a:r>
+            <a:r>
+              <a:rPr lang="en-US" dirty="0"/>
+              <a:t>the most </a:t>
             </a:r>
             <a:r>
               <a:rPr lang="en-US" dirty="0" err="1"/>
@@ -5897,15 +6136,19 @@
             </a:r>
             <a:r>
               <a:rPr lang="en-US" dirty="0"/>
-              <a:t> thing in his family. and he realized his wish got a car two months </a:t>
-            </a:r>
-            <a:r>
-              <a:rPr lang="en-US" dirty="0" err="1"/>
-              <a:t>ago.persons</a:t>
-            </a:r>
-            <a:r>
-              <a:rPr lang="en-US" dirty="0"/>
-              <a:t> like him become more than we can expect now.</a:t>
+              <a:t> thing in his family. and he </a:t>
+            </a:r>
+            <a:r>
+              <a:rPr lang="en-US" dirty="0">
+                <a:solidFill>
+                  <a:srgbClr val="DF5327"/>
+                </a:solidFill>
+              </a:rPr>
+              <a:t>realized</a:t>
+            </a:r>
+            <a:r>
+              <a:rPr lang="en-US" dirty="0"/>
+              <a:t> his wish got a car two months ago.persons like him become more than we can expect now.</a:t>
             </a:r>
           </a:p>
         </p:txBody>
@@ -6003,7 +6246,9 @@
           </a:xfrm>
         </p:spPr>
         <p:txBody>
-          <a:bodyPr/>
+          <a:bodyPr vert="horz" lIns="91440" tIns="45720" rIns="91440" bIns="45720" rtlCol="0" anchor="t">
+            <a:normAutofit/>
+          </a:bodyPr>
           <a:lstStyle/>
           <a:p>
             <a:pPr marL="0" indent="0">
@@ -6011,11 +6256,59 @@
             </a:pPr>
             <a:r>
               <a:rPr lang="en-US" dirty="0"/>
-              <a:t>On the other hand, when we go to the university, and this is another step of being students, I think the things change. It happens because we're getting in another </a:t>
-            </a:r>
-            <a:r>
-              <a:rPr lang="en-US" dirty="0" err="1"/>
-              <a:t>enviroment</a:t>
+              <a:t>On the other hand, when we go to </a:t>
+            </a:r>
+            <a:r>
+              <a:rPr lang="en-US" dirty="0">
+                <a:solidFill>
+                  <a:srgbClr val="C00000"/>
+                </a:solidFill>
+              </a:rPr>
+              <a:t>the</a:t>
+            </a:r>
+            <a:r>
+              <a:rPr lang="en-US" dirty="0"/>
+              <a:t> </a:t>
+            </a:r>
+            <a:r>
+              <a:rPr lang="en-US" dirty="0">
+                <a:solidFill>
+                  <a:srgbClr val="FF0000"/>
+                </a:solidFill>
+              </a:rPr>
+              <a:t>university</a:t>
+            </a:r>
+            <a:r>
+              <a:rPr lang="en-US" dirty="0"/>
+              <a:t>, and this is another step of being students, I think </a:t>
+            </a:r>
+            <a:r>
+              <a:rPr lang="en-US" dirty="0">
+                <a:solidFill>
+                  <a:srgbClr val="C00000"/>
+                </a:solidFill>
+              </a:rPr>
+              <a:t>the things</a:t>
+            </a:r>
+            <a:r>
+              <a:rPr lang="en-US" dirty="0"/>
+              <a:t> change. It happens because we're getting in </a:t>
+            </a:r>
+            <a:r>
+              <a:rPr lang="en-US" dirty="0">
+                <a:solidFill>
+                  <a:srgbClr val="002060"/>
+                </a:solidFill>
+              </a:rPr>
+              <a:t>some </a:t>
+            </a:r>
+            <a:r>
+              <a:rPr lang="en-US" dirty="0" err="1">
+                <a:solidFill>
+                  <a:srgbClr val="002060"/>
+                </a:solidFill>
+              </a:rPr>
+              <a:t>enviroments</a:t>
             </a:r>
             <a:r>
               <a:rPr lang="en-US" dirty="0"/>
@@ -6043,7 +6336,31 @@
             </a:r>
             <a:r>
               <a:rPr lang="en-US" dirty="0"/>
-              <a:t> during the high school) to the real facts.</a:t>
+              <a:t> during </a:t>
+            </a:r>
+            <a:r>
+              <a:rPr lang="en-US" dirty="0">
+                <a:solidFill>
+                  <a:srgbClr val="C00000"/>
+                </a:solidFill>
+              </a:rPr>
+              <a:t>the</a:t>
+            </a:r>
+            <a:r>
+              <a:rPr lang="en-US" dirty="0"/>
+              <a:t> </a:t>
+            </a:r>
+            <a:r>
+              <a:rPr lang="en-US" dirty="0">
+                <a:solidFill>
+                  <a:srgbClr val="C00000"/>
+                </a:solidFill>
+              </a:rPr>
+              <a:t>high</a:t>
+            </a:r>
+            <a:r>
+              <a:rPr lang="en-US" dirty="0"/>
+              <a:t> school) to the real facts.</a:t>
             </a:r>
           </a:p>
         </p:txBody>
@@ -6064,19 +6381,31 @@
           <a:lstStyle/>
           <a:p>
             <a:r>
-              <a:rPr lang="en-US" dirty="0"/>
+              <a:rPr lang="en-US" dirty="0">
+                <a:solidFill>
+                  <a:srgbClr val="A6B727"/>
+                </a:solidFill>
+              </a:rPr>
               <a:t>Omission of article</a:t>
             </a:r>
           </a:p>
           <a:p>
             <a:r>
-              <a:rPr lang="en-US" dirty="0"/>
+              <a:rPr lang="en-US" dirty="0">
+                <a:solidFill>
+                  <a:srgbClr val="FF0000"/>
+                </a:solidFill>
+              </a:rPr>
               <a:t>Extra article</a:t>
             </a:r>
           </a:p>
           <a:p>
             <a:r>
-              <a:rPr lang="en-US" dirty="0"/>
+              <a:rPr lang="en-US" dirty="0">
+                <a:solidFill>
+                  <a:srgbClr val="002060"/>
+                </a:solidFill>
+              </a:rPr>
               <a:t>Article-noun mismatch</a:t>
             </a:r>
           </a:p>
@@ -6316,7 +6645,7 @@
           <a:noFill/>
         </p:spPr>
         <p:txBody>
-          <a:bodyPr wrap="square" rtlCol="0">
+          <a:bodyPr wrap="square" rtlCol="0" anchor="t">
             <a:spAutoFit/>
           </a:bodyPr>
           <a:lstStyle/>
@@ -6326,7 +6655,11 @@
               <a:t>Second reason, old people always start to take care of their health which </a:t>
             </a:r>
             <a:r>
-              <a:rPr lang="en-US" dirty="0" err="1"/>
+              <a:rPr lang="en-US" dirty="0" err="1">
+                <a:solidFill>
+                  <a:srgbClr val="FF0000"/>
+                </a:solidFill>
+              </a:rPr>
               <a:t>absoultly</a:t>
             </a:r>
             <a:r>
@@ -6334,15 +6667,35 @@
               <a:t> goes down as they get older. In the other hand, young people think about no </a:t>
             </a:r>
             <a:r>
-              <a:rPr lang="en-US" dirty="0" err="1"/>
+              <a:rPr lang="en-US" dirty="0" err="1">
+                <a:solidFill>
+                  <a:srgbClr val="FF0000"/>
+                </a:solidFill>
+              </a:rPr>
               <a:t>resposibilty</a:t>
             </a:r>
             <a:r>
               <a:rPr lang="en-US" dirty="0"/>
-              <a:t> and no problems with their health, so why don't they enjoy their lives before anything happens in the future. For example, if someone who is 60 years old and he is retired from his job, he could have health problems refuses him to enjoy his life. Another man who is 20 years old, who just finished his high school and he wants to play sports and going out with his friends without any health problems </a:t>
-            </a:r>
-            <a:r>
-              <a:rPr lang="en-US" dirty="0" err="1"/>
+              <a:t> and no problems with their health, so why don't they enjoy their lives before anything happens in the future. For example, if someone who is 60 years old and he is retired from his job, he could have health problems </a:t>
+            </a:r>
+            <a:r>
+              <a:rPr lang="en-US" dirty="0">
+                <a:solidFill>
+                  <a:srgbClr val="FF0000"/>
+                </a:solidFill>
+              </a:rPr>
+              <a:t>refuses</a:t>
+            </a:r>
+            <a:r>
+              <a:rPr lang="en-US" dirty="0"/>
+              <a:t> him to enjoy his life. Another man who is 20 years old, who just finished his high school and he wants to play sports and going out with his friends without any health problems </a:t>
+            </a:r>
+            <a:r>
+              <a:rPr lang="en-US" dirty="0" err="1">
+                <a:solidFill>
+                  <a:srgbClr val="FF0000"/>
+                </a:solidFill>
+              </a:rPr>
               <a:t>thats</a:t>
             </a:r>
             <a:r>
@@ -6350,7 +6703,11 @@
               <a:t> if we ignore the </a:t>
             </a:r>
             <a:r>
-              <a:rPr lang="en-US" dirty="0" err="1"/>
+              <a:rPr lang="en-US" dirty="0" err="1">
+                <a:solidFill>
+                  <a:srgbClr val="FF0000"/>
+                </a:solidFill>
+              </a:rPr>
               <a:t>exceptinals</a:t>
             </a:r>
             <a:r>
@@ -6377,7 +6734,7 @@
           <a:noFill/>
         </p:spPr>
         <p:txBody>
-          <a:bodyPr wrap="square" rtlCol="0">
+          <a:bodyPr wrap="square" rtlCol="0" anchor="t">
             <a:spAutoFit/>
           </a:bodyPr>
           <a:lstStyle/>
@@ -6387,7 +6744,11 @@
               <a:t>Advertising uses those instruments that have the bigger impact on human personality: image, sound and </a:t>
             </a:r>
             <a:r>
-              <a:rPr lang="en-US" dirty="0" err="1"/>
+              <a:rPr lang="en-US" dirty="0" err="1">
+                <a:solidFill>
+                  <a:srgbClr val="FF0000"/>
+                </a:solidFill>
+              </a:rPr>
               <a:t>psicology</a:t>
             </a:r>
             <a:r>
@@ -6419,7 +6780,11 @@
               <a:t> of control on people. If you are able to enter there mind with a </a:t>
             </a:r>
             <a:r>
-              <a:rPr lang="en-US" dirty="0" err="1"/>
+              <a:rPr lang="en-US" dirty="0" err="1">
+                <a:solidFill>
+                  <a:srgbClr val="FF0000"/>
+                </a:solidFill>
+              </a:rPr>
               <a:t>powerfull</a:t>
             </a:r>
             <a:r>
@@ -6522,7 +6887,9 @@
           </a:xfrm>
         </p:spPr>
         <p:txBody>
-          <a:bodyPr/>
+          <a:bodyPr vert="horz" lIns="91440" tIns="45720" rIns="91440" bIns="45720" rtlCol="0" anchor="t">
+            <a:normAutofit/>
+          </a:bodyPr>
           <a:lstStyle/>
           <a:p>
             <a:pPr marL="0" indent="0">
@@ -6530,7 +6897,19 @@
             </a:pPr>
             <a:r>
               <a:rPr lang="en-US" dirty="0"/>
-              <a:t>Students can improve themselves by thinking on a subject that they learn the major ideas, they will become more creative and more observer and that characteristics </a:t>
+              <a:t>Students can improve themselves by thinking </a:t>
+            </a:r>
+            <a:r>
+              <a:rPr lang="en-US" dirty="0">
+                <a:solidFill>
+                  <a:srgbClr val="FF0000"/>
+                </a:solidFill>
+              </a:rPr>
+              <a:t>on</a:t>
+            </a:r>
+            <a:r>
+              <a:rPr lang="en-US" dirty="0"/>
+              <a:t> a subject that they learn the major ideas, they will become more creative and more observer and that characteristics </a:t>
             </a:r>
             <a:r>
               <a:rPr lang="en-US" dirty="0" err="1"/>
@@ -6546,7 +6925,19 @@
             </a:r>
             <a:r>
               <a:rPr lang="en-US" dirty="0"/>
-              <a:t> they let them to learn the major ideas and concepts.</a:t>
+              <a:t> they let them </a:t>
+            </a:r>
+            <a:r>
+              <a:rPr lang="en-US" dirty="0">
+                <a:solidFill>
+                  <a:srgbClr val="FF0000"/>
+                </a:solidFill>
+              </a:rPr>
+              <a:t>to</a:t>
+            </a:r>
+            <a:r>
+              <a:rPr lang="en-US" dirty="0"/>
+              <a:t> learn the major ideas and concepts.</a:t>
             </a:r>
           </a:p>
         </p:txBody>

</xml_diff>